<commit_message>
QR code on front slide
</commit_message>
<xml_diff>
--- a/2019/slides/Guidelines_for_Beginners/A_Practical_Introduction_to_CSCS_HPC_Infrastructure.pptx
+++ b/2019/slides/Guidelines_for_Beginners/A_Practical_Introduction_to_CSCS_HPC_Infrastructure.pptx
@@ -15036,7 +15036,7 @@
         <p:spPr>
           <a:xfrm>
             <a:off x="431640" y="4517605"/>
-            <a:ext cx="11328120" cy="2160360"/>
+            <a:ext cx="6765865" cy="2160360"/>
           </a:xfrm>
           <a:prstGeom prst="rect">
             <a:avLst/>
@@ -15157,6 +15157,42 @@
           </a:p>
         </p:txBody>
       </p:sp>
+      <p:pic>
+        <p:nvPicPr>
+          <p:cNvPr id="5" name="Picture 4">
+            <a:extLst>
+              <a:ext uri="{FF2B5EF4-FFF2-40B4-BE49-F238E27FC236}">
+                <a16:creationId xmlns:a16="http://schemas.microsoft.com/office/drawing/2014/main" id="{2242FEC3-6077-7242-A016-9AC10AA1BCFB}"/>
+              </a:ext>
+            </a:extLst>
+          </p:cNvPr>
+          <p:cNvPicPr>
+            <a:picLocks noChangeAspect="1"/>
+          </p:cNvPicPr>
+          <p:nvPr/>
+        </p:nvPicPr>
+        <p:blipFill>
+          <a:blip r:embed="rId3">
+            <a:extLst>
+              <a:ext uri="{28A0092B-C50C-407E-A947-70E740481C1C}">
+                <a14:useLocalDpi xmlns:a14="http://schemas.microsoft.com/office/drawing/2010/main" val="0"/>
+              </a:ext>
+            </a:extLst>
+          </a:blip>
+          <a:stretch>
+            <a:fillRect/>
+          </a:stretch>
+        </p:blipFill>
+        <p:spPr>
+          <a:xfrm>
+            <a:off x="9768689" y="3974470"/>
+            <a:ext cx="2423311" cy="2423311"/>
+          </a:xfrm>
+          <a:prstGeom prst="rect">
+            <a:avLst/>
+          </a:prstGeom>
+        </p:spPr>
+      </p:pic>
     </p:spTree>
   </p:cSld>
   <p:clrMapOvr>
@@ -17088,14 +17124,14 @@
           <a:effectLst/>
           <a:extLst>
             <a:ext uri="{909E8E84-426E-40dd-AFC4-6F175D3DCCD1}">
-              <a14:hiddenFill xmlns="" xmlns:a14="http://schemas.microsoft.com/office/drawing/2010/main">
+              <a14:hiddenFill xmlns:a14="http://schemas.microsoft.com/office/drawing/2010/main" xmlns="">
                 <a:solidFill>
                   <a:schemeClr val="accent1"/>
                 </a:solidFill>
               </a14:hiddenFill>
             </a:ext>
             <a:ext uri="{91240B29-F687-4f45-9708-019B960494DF}">
-              <a14:hiddenLine xmlns="" xmlns:a14="http://schemas.microsoft.com/office/drawing/2010/main" w="9525">
+              <a14:hiddenLine xmlns:a14="http://schemas.microsoft.com/office/drawing/2010/main" xmlns="" w="9525">
                 <a:solidFill>
                   <a:schemeClr val="tx1"/>
                 </a:solidFill>
@@ -17105,7 +17141,7 @@
               </a14:hiddenLine>
             </a:ext>
             <a:ext uri="{AF507438-7753-43e0-B8FC-AC1667EBCBE1}">
-              <a14:hiddenEffects xmlns="" xmlns:a14="http://schemas.microsoft.com/office/drawing/2010/main">
+              <a14:hiddenEffects xmlns:a14="http://schemas.microsoft.com/office/drawing/2010/main" xmlns="">
                 <a:effectLst>
                   <a:outerShdw dist="35921" dir="2700000" algn="ctr" rotWithShape="0">
                     <a:schemeClr val="bg2"/>

</xml_diff>